<commit_message>
flow for pred performance
</commit_message>
<xml_diff>
--- a/visualizations/flow-fit-cTree-rForest.pptx
+++ b/visualizations/flow-fit-cTree-rForest.pptx
@@ -3067,7 +3067,7 @@
         </p:nvSpPr>
         <p:spPr>
           <a:xfrm>
-            <a:off x="3505200" y="3048000"/>
+            <a:off x="3276600" y="3048000"/>
             <a:ext cx="1794076" cy="685800"/>
           </a:xfrm>
           <a:prstGeom prst="rect">
@@ -3107,20 +3107,12 @@
           <a:p>
             <a:pPr algn="ctr"/>
             <a:r>
-              <a:rPr lang="en-US" dirty="0" err="1">
-                <a:solidFill>
-                  <a:sysClr val="windowText" lastClr="000000"/>
-                </a:solidFill>
-              </a:rPr>
-              <a:t>m</a:t>
-            </a:r>
-            <a:r>
               <a:rPr lang="en-US" dirty="0" err="1" smtClean="0">
                 <a:solidFill>
                   <a:sysClr val="windowText" lastClr="000000"/>
                 </a:solidFill>
               </a:rPr>
-              <a:t>ain.R</a:t>
+              <a:t>mainPlotter.R</a:t>
             </a:r>
             <a:endParaRPr lang="en-US" dirty="0">
               <a:solidFill>
@@ -3138,7 +3130,7 @@
         </p:nvSpPr>
         <p:spPr>
           <a:xfrm>
-            <a:off x="6858000" y="1752600"/>
+            <a:off x="304800" y="2514600"/>
             <a:ext cx="1676400" cy="609600"/>
           </a:xfrm>
           <a:prstGeom prst="flowChartAlternateProcess">
@@ -3190,129 +3182,13 @@
       </p:sp>
       <p:sp>
         <p:nvSpPr>
-          <p:cNvPr id="20" name="Flowchart: Alternate Process 19"/>
-          <p:cNvSpPr/>
-          <p:nvPr/>
-        </p:nvSpPr>
-        <p:spPr>
-          <a:xfrm>
-            <a:off x="457200" y="2743200"/>
-            <a:ext cx="1371600" cy="609600"/>
-          </a:xfrm>
-          <a:prstGeom prst="flowChartAlternateProcess">
-            <a:avLst/>
-          </a:prstGeom>
-          <a:solidFill>
-            <a:schemeClr val="accent1">
-              <a:lumMod val="40000"/>
-              <a:lumOff val="60000"/>
-            </a:schemeClr>
-          </a:solidFill>
-        </p:spPr>
-        <p:style>
-          <a:lnRef idx="2">
-            <a:schemeClr val="accent1">
-              <a:shade val="50000"/>
-            </a:schemeClr>
-          </a:lnRef>
-          <a:fillRef idx="1">
-            <a:schemeClr val="accent1"/>
-          </a:fillRef>
-          <a:effectRef idx="0">
-            <a:schemeClr val="accent1"/>
-          </a:effectRef>
-          <a:fontRef idx="minor">
-            <a:schemeClr val="lt1"/>
-          </a:fontRef>
-        </p:style>
-        <p:txBody>
-          <a:bodyPr rtlCol="0" anchor="ctr"/>
-          <a:lstStyle/>
-          <a:p>
-            <a:pPr algn="ctr"/>
-            <a:r>
-              <a:rPr lang="en-US" dirty="0" smtClean="0">
-                <a:solidFill>
-                  <a:sysClr val="windowText" lastClr="000000"/>
-                </a:solidFill>
-              </a:rPr>
-              <a:t>datTrn.txt</a:t>
-            </a:r>
-            <a:endParaRPr lang="en-US" dirty="0">
-              <a:solidFill>
-                <a:sysClr val="windowText" lastClr="000000"/>
-              </a:solidFill>
-            </a:endParaRPr>
-          </a:p>
-        </p:txBody>
-      </p:sp>
-      <p:sp>
-        <p:nvSpPr>
-          <p:cNvPr id="22" name="Flowchart: Alternate Process 21"/>
-          <p:cNvSpPr/>
-          <p:nvPr/>
-        </p:nvSpPr>
-        <p:spPr>
-          <a:xfrm>
-            <a:off x="457200" y="3581400"/>
-            <a:ext cx="1371600" cy="609600"/>
-          </a:xfrm>
-          <a:prstGeom prst="flowChartAlternateProcess">
-            <a:avLst/>
-          </a:prstGeom>
-          <a:solidFill>
-            <a:schemeClr val="accent1">
-              <a:lumMod val="40000"/>
-              <a:lumOff val="60000"/>
-            </a:schemeClr>
-          </a:solidFill>
-        </p:spPr>
-        <p:style>
-          <a:lnRef idx="2">
-            <a:schemeClr val="accent1">
-              <a:shade val="50000"/>
-            </a:schemeClr>
-          </a:lnRef>
-          <a:fillRef idx="1">
-            <a:schemeClr val="accent1"/>
-          </a:fillRef>
-          <a:effectRef idx="0">
-            <a:schemeClr val="accent1"/>
-          </a:effectRef>
-          <a:fontRef idx="minor">
-            <a:schemeClr val="lt1"/>
-          </a:fontRef>
-        </p:style>
-        <p:txBody>
-          <a:bodyPr rtlCol="0" anchor="ctr"/>
-          <a:lstStyle/>
-          <a:p>
-            <a:pPr algn="ctr"/>
-            <a:r>
-              <a:rPr lang="en-US" dirty="0" smtClean="0">
-                <a:solidFill>
-                  <a:sysClr val="windowText" lastClr="000000"/>
-                </a:solidFill>
-              </a:rPr>
-              <a:t>datTest.txt</a:t>
-            </a:r>
-            <a:endParaRPr lang="en-US" dirty="0">
-              <a:solidFill>
-                <a:sysClr val="windowText" lastClr="000000"/>
-              </a:solidFill>
-            </a:endParaRPr>
-          </a:p>
-        </p:txBody>
-      </p:sp>
-      <p:sp>
-        <p:nvSpPr>
           <p:cNvPr id="23" name="Flowchart: Alternate Process 22"/>
           <p:cNvSpPr/>
           <p:nvPr/>
         </p:nvSpPr>
         <p:spPr>
           <a:xfrm>
-            <a:off x="6858000" y="2514600"/>
+            <a:off x="304800" y="3276600"/>
             <a:ext cx="1676400" cy="609600"/>
           </a:xfrm>
           <a:prstGeom prst="flowChartAlternateProcess">
@@ -3370,7 +3246,7 @@
         </p:nvSpPr>
         <p:spPr>
           <a:xfrm>
-            <a:off x="6858000" y="3886200"/>
+            <a:off x="304800" y="4343400"/>
             <a:ext cx="1676400" cy="609600"/>
           </a:xfrm>
           <a:prstGeom prst="flowChartAlternateProcess">
@@ -3428,7 +3304,7 @@
         </p:nvSpPr>
         <p:spPr>
           <a:xfrm>
-            <a:off x="6858000" y="4648200"/>
+            <a:off x="304800" y="5105400"/>
             <a:ext cx="1676400" cy="609600"/>
           </a:xfrm>
           <a:prstGeom prst="flowChartAlternateProcess">
@@ -3482,15 +3358,15 @@
         <p:nvCxnSpPr>
           <p:cNvPr id="3" name="Straight Arrow Connector 2"/>
           <p:cNvCxnSpPr>
-            <a:stCxn id="20" idx="3"/>
+            <a:stCxn id="15" idx="3"/>
             <a:endCxn id="17" idx="1"/>
           </p:cNvCxnSpPr>
           <p:nvPr/>
         </p:nvCxnSpPr>
         <p:spPr>
           <a:xfrm>
-            <a:off x="1828800" y="3048000"/>
-            <a:ext cx="1676400" cy="342900"/>
+            <a:off x="1981200" y="1676400"/>
+            <a:ext cx="1295400" cy="1714500"/>
           </a:xfrm>
           <a:prstGeom prst="straightConnector1">
             <a:avLst/>
@@ -3521,14 +3397,112 @@
         <p:nvCxnSpPr>
           <p:cNvPr id="32" name="Straight Arrow Connector 31"/>
           <p:cNvCxnSpPr>
+            <a:stCxn id="18" idx="3"/>
+            <a:endCxn id="17" idx="1"/>
+          </p:cNvCxnSpPr>
+          <p:nvPr/>
+        </p:nvCxnSpPr>
+        <p:spPr>
+          <a:xfrm>
+            <a:off x="1981200" y="2819400"/>
+            <a:ext cx="1295400" cy="571500"/>
+          </a:xfrm>
+          <a:prstGeom prst="straightConnector1">
+            <a:avLst/>
+          </a:prstGeom>
+          <a:ln>
+            <a:solidFill>
+              <a:schemeClr val="tx1"/>
+            </a:solidFill>
+            <a:tailEnd type="arrow"/>
+          </a:ln>
+        </p:spPr>
+        <p:style>
+          <a:lnRef idx="1">
+            <a:schemeClr val="accent1"/>
+          </a:lnRef>
+          <a:fillRef idx="0">
+            <a:schemeClr val="accent1"/>
+          </a:fillRef>
+          <a:effectRef idx="0">
+            <a:schemeClr val="accent1"/>
+          </a:effectRef>
+          <a:fontRef idx="minor">
+            <a:schemeClr val="tx1"/>
+          </a:fontRef>
+        </p:style>
+      </p:cxnSp>
+      <p:sp>
+        <p:nvSpPr>
+          <p:cNvPr id="15" name="Flowchart: Alternate Process 14"/>
+          <p:cNvSpPr/>
+          <p:nvPr/>
+        </p:nvSpPr>
+        <p:spPr>
+          <a:xfrm>
+            <a:off x="304800" y="1371600"/>
+            <a:ext cx="1676400" cy="609600"/>
+          </a:xfrm>
+          <a:prstGeom prst="flowChartAlternateProcess">
+            <a:avLst/>
+          </a:prstGeom>
+          <a:solidFill>
+            <a:schemeClr val="accent1">
+              <a:lumMod val="40000"/>
+              <a:lumOff val="60000"/>
+            </a:schemeClr>
+          </a:solidFill>
+        </p:spPr>
+        <p:style>
+          <a:lnRef idx="2">
+            <a:schemeClr val="accent1">
+              <a:shade val="50000"/>
+            </a:schemeClr>
+          </a:lnRef>
+          <a:fillRef idx="1">
+            <a:schemeClr val="accent1"/>
+          </a:fillRef>
+          <a:effectRef idx="0">
+            <a:schemeClr val="accent1"/>
+          </a:effectRef>
+          <a:fontRef idx="minor">
+            <a:schemeClr val="lt1"/>
+          </a:fontRef>
+        </p:style>
+        <p:txBody>
+          <a:bodyPr rtlCol="0" anchor="ctr"/>
+          <a:lstStyle/>
+          <a:p>
+            <a:pPr algn="ctr"/>
+            <a:r>
+              <a:rPr lang="en-US" dirty="0" smtClean="0">
+                <a:solidFill>
+                  <a:sysClr val="windowText" lastClr="000000"/>
+                </a:solidFill>
+              </a:rPr>
+              <a:t>fbTree.txt</a:t>
+            </a:r>
+            <a:endParaRPr lang="en-US" dirty="0">
+              <a:solidFill>
+                <a:sysClr val="windowText" lastClr="000000"/>
+              </a:solidFill>
+            </a:endParaRPr>
+          </a:p>
+        </p:txBody>
+      </p:sp>
+      <p:cxnSp>
+        <p:nvCxnSpPr>
+          <p:cNvPr id="19" name="Straight Arrow Connector 18"/>
+          <p:cNvCxnSpPr>
+            <a:stCxn id="23" idx="3"/>
             <a:endCxn id="17" idx="1"/>
           </p:cNvCxnSpPr>
           <p:nvPr/>
         </p:nvCxnSpPr>
         <p:spPr>
           <a:xfrm flipV="1">
-            <a:off x="1676400" y="3390900"/>
-            <a:ext cx="1828800" cy="495300"/>
+            <a:off x="1981200" y="3390900"/>
+            <a:ext cx="1295400" cy="190500"/>
           </a:xfrm>
           <a:prstGeom prst="straightConnector1">
             <a:avLst/>
@@ -3557,17 +3531,17 @@
       </p:cxnSp>
       <p:cxnSp>
         <p:nvCxnSpPr>
-          <p:cNvPr id="35" name="Straight Arrow Connector 34"/>
+          <p:cNvPr id="21" name="Straight Arrow Connector 20"/>
           <p:cNvCxnSpPr>
-            <a:stCxn id="17" idx="3"/>
-            <a:endCxn id="18" idx="1"/>
+            <a:stCxn id="24" idx="3"/>
+            <a:endCxn id="17" idx="1"/>
           </p:cNvCxnSpPr>
           <p:nvPr/>
         </p:nvCxnSpPr>
         <p:spPr>
           <a:xfrm flipV="1">
-            <a:off x="5299276" y="2057400"/>
-            <a:ext cx="1558724" cy="1333500"/>
+            <a:off x="1981200" y="3390900"/>
+            <a:ext cx="1295400" cy="1257300"/>
           </a:xfrm>
           <a:prstGeom prst="straightConnector1">
             <a:avLst/>
@@ -3596,17 +3570,172 @@
       </p:cxnSp>
       <p:cxnSp>
         <p:nvCxnSpPr>
-          <p:cNvPr id="36" name="Straight Arrow Connector 35"/>
+          <p:cNvPr id="26" name="Straight Arrow Connector 25"/>
           <p:cNvCxnSpPr>
-            <a:stCxn id="17" idx="3"/>
-            <a:endCxn id="23" idx="1"/>
+            <a:stCxn id="25" idx="3"/>
+            <a:endCxn id="17" idx="1"/>
           </p:cNvCxnSpPr>
           <p:nvPr/>
         </p:nvCxnSpPr>
         <p:spPr>
           <a:xfrm flipV="1">
-            <a:off x="5299276" y="2819400"/>
-            <a:ext cx="1558724" cy="571500"/>
+            <a:off x="1981200" y="3390900"/>
+            <a:ext cx="1295400" cy="2019300"/>
+          </a:xfrm>
+          <a:prstGeom prst="straightConnector1">
+            <a:avLst/>
+          </a:prstGeom>
+          <a:ln>
+            <a:solidFill>
+              <a:schemeClr val="tx1"/>
+            </a:solidFill>
+            <a:tailEnd type="arrow"/>
+          </a:ln>
+        </p:spPr>
+        <p:style>
+          <a:lnRef idx="1">
+            <a:schemeClr val="accent1"/>
+          </a:lnRef>
+          <a:fillRef idx="0">
+            <a:schemeClr val="accent1"/>
+          </a:fillRef>
+          <a:effectRef idx="0">
+            <a:schemeClr val="accent1"/>
+          </a:effectRef>
+          <a:fontRef idx="minor">
+            <a:schemeClr val="tx1"/>
+          </a:fontRef>
+        </p:style>
+      </p:cxnSp>
+      <p:sp>
+        <p:nvSpPr>
+          <p:cNvPr id="27" name="Flowchart: Alternate Process 26"/>
+          <p:cNvSpPr/>
+          <p:nvPr/>
+        </p:nvSpPr>
+        <p:spPr>
+          <a:xfrm>
+            <a:off x="6019800" y="2667000"/>
+            <a:ext cx="2819400" cy="609600"/>
+          </a:xfrm>
+          <a:prstGeom prst="flowChartAlternateProcess">
+            <a:avLst/>
+          </a:prstGeom>
+          <a:solidFill>
+            <a:schemeClr val="accent1">
+              <a:lumMod val="40000"/>
+              <a:lumOff val="60000"/>
+            </a:schemeClr>
+          </a:solidFill>
+        </p:spPr>
+        <p:style>
+          <a:lnRef idx="2">
+            <a:schemeClr val="accent1">
+              <a:shade val="50000"/>
+            </a:schemeClr>
+          </a:lnRef>
+          <a:fillRef idx="1">
+            <a:schemeClr val="accent1"/>
+          </a:fillRef>
+          <a:effectRef idx="0">
+            <a:schemeClr val="accent1"/>
+          </a:effectRef>
+          <a:fontRef idx="minor">
+            <a:schemeClr val="lt1"/>
+          </a:fontRef>
+        </p:style>
+        <p:txBody>
+          <a:bodyPr rtlCol="0" anchor="ctr"/>
+          <a:lstStyle/>
+          <a:p>
+            <a:pPr algn="ctr"/>
+            <a:r>
+              <a:rPr lang="en-US" dirty="0">
+                <a:solidFill>
+                  <a:sysClr val="windowText" lastClr="000000"/>
+                </a:solidFill>
+              </a:rPr>
+              <a:t>pred-performance-nok.pdf</a:t>
+            </a:r>
+            <a:endParaRPr lang="en-US" dirty="0">
+              <a:solidFill>
+                <a:sysClr val="windowText" lastClr="000000"/>
+              </a:solidFill>
+            </a:endParaRPr>
+          </a:p>
+        </p:txBody>
+      </p:sp>
+      <p:sp>
+        <p:nvSpPr>
+          <p:cNvPr id="28" name="Flowchart: Alternate Process 27"/>
+          <p:cNvSpPr/>
+          <p:nvPr/>
+        </p:nvSpPr>
+        <p:spPr>
+          <a:xfrm>
+            <a:off x="6019800" y="3581400"/>
+            <a:ext cx="2819400" cy="609600"/>
+          </a:xfrm>
+          <a:prstGeom prst="flowChartAlternateProcess">
+            <a:avLst/>
+          </a:prstGeom>
+          <a:solidFill>
+            <a:schemeClr val="accent1">
+              <a:lumMod val="40000"/>
+              <a:lumOff val="60000"/>
+            </a:schemeClr>
+          </a:solidFill>
+        </p:spPr>
+        <p:style>
+          <a:lnRef idx="2">
+            <a:schemeClr val="accent1">
+              <a:shade val="50000"/>
+            </a:schemeClr>
+          </a:lnRef>
+          <a:fillRef idx="1">
+            <a:schemeClr val="accent1"/>
+          </a:fillRef>
+          <a:effectRef idx="0">
+            <a:schemeClr val="accent1"/>
+          </a:effectRef>
+          <a:fontRef idx="minor">
+            <a:schemeClr val="lt1"/>
+          </a:fontRef>
+        </p:style>
+        <p:txBody>
+          <a:bodyPr rtlCol="0" anchor="ctr"/>
+          <a:lstStyle/>
+          <a:p>
+            <a:pPr algn="ctr"/>
+            <a:r>
+              <a:rPr lang="en-US" dirty="0" smtClean="0">
+                <a:solidFill>
+                  <a:sysClr val="windowText" lastClr="000000"/>
+                </a:solidFill>
+              </a:rPr>
+              <a:t>pred-performance-k.pdf</a:t>
+            </a:r>
+            <a:endParaRPr lang="en-US" dirty="0">
+              <a:solidFill>
+                <a:sysClr val="windowText" lastClr="000000"/>
+              </a:solidFill>
+            </a:endParaRPr>
+          </a:p>
+        </p:txBody>
+      </p:sp>
+      <p:cxnSp>
+        <p:nvCxnSpPr>
+          <p:cNvPr id="12" name="Straight Arrow Connector 11"/>
+          <p:cNvCxnSpPr>
+            <a:stCxn id="17" idx="3"/>
+            <a:endCxn id="27" idx="1"/>
+          </p:cNvCxnSpPr>
+          <p:nvPr/>
+        </p:nvCxnSpPr>
+        <p:spPr>
+          <a:xfrm flipV="1">
+            <a:off x="5070676" y="2971800"/>
+            <a:ext cx="949124" cy="419100"/>
           </a:xfrm>
           <a:prstGeom prst="straightConnector1">
             <a:avLst/>
@@ -3635,56 +3764,17 @@
       </p:cxnSp>
       <p:cxnSp>
         <p:nvCxnSpPr>
-          <p:cNvPr id="37" name="Straight Arrow Connector 36"/>
+          <p:cNvPr id="33" name="Straight Arrow Connector 32"/>
           <p:cNvCxnSpPr>
             <a:stCxn id="17" idx="3"/>
-            <a:endCxn id="24" idx="1"/>
+            <a:endCxn id="28" idx="1"/>
           </p:cNvCxnSpPr>
           <p:nvPr/>
         </p:nvCxnSpPr>
         <p:spPr>
           <a:xfrm>
-            <a:off x="5299276" y="3390900"/>
-            <a:ext cx="1558724" cy="800100"/>
-          </a:xfrm>
-          <a:prstGeom prst="straightConnector1">
-            <a:avLst/>
-          </a:prstGeom>
-          <a:ln>
-            <a:solidFill>
-              <a:schemeClr val="tx1"/>
-            </a:solidFill>
-            <a:tailEnd type="arrow"/>
-          </a:ln>
-        </p:spPr>
-        <p:style>
-          <a:lnRef idx="1">
-            <a:schemeClr val="accent1"/>
-          </a:lnRef>
-          <a:fillRef idx="0">
-            <a:schemeClr val="accent1"/>
-          </a:fillRef>
-          <a:effectRef idx="0">
-            <a:schemeClr val="accent1"/>
-          </a:effectRef>
-          <a:fontRef idx="minor">
-            <a:schemeClr val="tx1"/>
-          </a:fontRef>
-        </p:style>
-      </p:cxnSp>
-      <p:cxnSp>
-        <p:nvCxnSpPr>
-          <p:cNvPr id="40" name="Straight Arrow Connector 39"/>
-          <p:cNvCxnSpPr>
-            <a:stCxn id="17" idx="3"/>
-            <a:endCxn id="25" idx="1"/>
-          </p:cNvCxnSpPr>
-          <p:nvPr/>
-        </p:nvCxnSpPr>
-        <p:spPr>
-          <a:xfrm>
-            <a:off x="5299276" y="3390900"/>
-            <a:ext cx="1558724" cy="1562100"/>
+            <a:off x="5070676" y="3390900"/>
+            <a:ext cx="949124" cy="495300"/>
           </a:xfrm>
           <a:prstGeom prst="straightConnector1">
             <a:avLst/>

</xml_diff>